<commit_message>
Add slides about objects
</commit_message>
<xml_diff>
--- a/Python101_03_Fungsi-Import.pptx
+++ b/Python101_03_Fungsi-Import.pptx
@@ -7,9 +7,10 @@
   <p:sldIdLst>
     <p:sldId id="256" r:id="rId2"/>
     <p:sldId id="257" r:id="rId3"/>
-    <p:sldId id="258" r:id="rId4"/>
-    <p:sldId id="259" r:id="rId5"/>
-    <p:sldId id="260" r:id="rId6"/>
+    <p:sldId id="260" r:id="rId4"/>
+    <p:sldId id="258" r:id="rId5"/>
+    <p:sldId id="259" r:id="rId6"/>
+    <p:sldId id="261" r:id="rId7"/>
   </p:sldIdLst>
   <p:sldSz cx="12192000" cy="6858000"/>
   <p:notesSz cx="6858000" cy="9144000"/>
@@ -6622,49 +6623,51 @@
           </a:xfrm>
         </p:spPr>
         <p:txBody>
-          <a:bodyPr/>
-          <a:lstStyle/>
-          <a:p>
-            <a:r>
-              <a:rPr lang="en-US" dirty="0"/>
+          <a:bodyPr>
+            <a:normAutofit/>
+          </a:bodyPr>
+          <a:lstStyle/>
+          <a:p>
+            <a:r>
+              <a:rPr lang="en-US" sz="2400" dirty="0"/>
               <a:t>Function: set of re-usable instructions .</a:t>
             </a:r>
           </a:p>
           <a:p>
             <a:r>
-              <a:rPr lang="en-US" i="1" dirty="0"/>
+              <a:rPr lang="en-US" sz="2400" i="1" dirty="0"/>
               <a:t>Built-in functions</a:t>
             </a:r>
             <a:r>
-              <a:rPr lang="en-US" dirty="0"/>
+              <a:rPr lang="en-US" sz="2400" dirty="0"/>
               <a:t>: range(), </a:t>
             </a:r>
             <a:r>
-              <a:rPr lang="en-US" dirty="0" err="1"/>
+              <a:rPr lang="en-US" sz="2400" dirty="0" err="1"/>
               <a:t>len</a:t>
             </a:r>
             <a:r>
-              <a:rPr lang="en-US" dirty="0"/>
+              <a:rPr lang="en-US" sz="2400" dirty="0"/>
               <a:t>(), max(), min(), sum()</a:t>
             </a:r>
           </a:p>
           <a:p>
             <a:r>
-              <a:rPr lang="en-US" dirty="0"/>
+              <a:rPr lang="en-US" sz="2400" dirty="0"/>
               <a:t>To define new function, use </a:t>
             </a:r>
             <a:r>
-              <a:rPr lang="en-US" i="1" dirty="0"/>
+              <a:rPr lang="en-US" sz="2400" i="1" dirty="0"/>
               <a:t>def</a:t>
             </a:r>
             <a:r>
-              <a:rPr lang="en-US" dirty="0"/>
+              <a:rPr lang="en-US" sz="2400" dirty="0"/>
               <a:t> keyword</a:t>
             </a:r>
           </a:p>
           <a:p>
             <a:r>
-              <a:rPr lang="en-US" dirty="0"/>
+              <a:rPr lang="en-US" sz="2400" dirty="0"/>
               <a:t>Keywork return to returning control and or value(s) to calling function</a:t>
             </a:r>
           </a:p>
@@ -6734,6 +6737,131 @@
           <p:cNvPr id="2" name="Title 1">
             <a:extLst>
               <a:ext uri="{FF2B5EF4-FFF2-40B4-BE49-F238E27FC236}">
+                <a16:creationId xmlns:a16="http://schemas.microsoft.com/office/drawing/2014/main" id="{A90B9977-D7B0-7954-261C-E87C0EF1DE12}"/>
+              </a:ext>
+            </a:extLst>
+          </p:cNvPr>
+          <p:cNvSpPr>
+            <a:spLocks noGrp="1"/>
+          </p:cNvSpPr>
+          <p:nvPr>
+            <p:ph type="title"/>
+          </p:nvPr>
+        </p:nvSpPr>
+        <p:spPr>
+          <a:xfrm>
+            <a:off x="913795" y="609600"/>
+            <a:ext cx="3877280" cy="970450"/>
+          </a:xfrm>
+        </p:spPr>
+        <p:txBody>
+          <a:bodyPr/>
+          <a:lstStyle/>
+          <a:p>
+            <a:r>
+              <a:rPr lang="en-US" dirty="0"/>
+              <a:t>Module</a:t>
+            </a:r>
+            <a:endParaRPr lang="en-MY" dirty="0"/>
+          </a:p>
+        </p:txBody>
+      </p:sp>
+      <p:sp>
+        <p:nvSpPr>
+          <p:cNvPr id="5" name="Content Placeholder 4">
+            <a:extLst>
+              <a:ext uri="{FF2B5EF4-FFF2-40B4-BE49-F238E27FC236}">
+                <a16:creationId xmlns:a16="http://schemas.microsoft.com/office/drawing/2014/main" id="{AA5A9387-1D79-ACE3-2AE3-194C7B1D6E54}"/>
+              </a:ext>
+            </a:extLst>
+          </p:cNvPr>
+          <p:cNvSpPr>
+            <a:spLocks noGrp="1"/>
+          </p:cNvSpPr>
+          <p:nvPr>
+            <p:ph sz="half" idx="1"/>
+          </p:nvPr>
+        </p:nvSpPr>
+        <p:spPr/>
+        <p:txBody>
+          <a:bodyPr/>
+          <a:lstStyle/>
+          <a:p>
+            <a:r>
+              <a:rPr lang="en-US" sz="2800" dirty="0"/>
+              <a:t>A file containing Python definitions and statements</a:t>
+            </a:r>
+          </a:p>
+          <a:p>
+            <a:endParaRPr lang="en-MY" dirty="0"/>
+          </a:p>
+        </p:txBody>
+      </p:sp>
+      <p:pic>
+        <p:nvPicPr>
+          <p:cNvPr id="8" name="Picture 7">
+            <a:extLst>
+              <a:ext uri="{FF2B5EF4-FFF2-40B4-BE49-F238E27FC236}">
+                <a16:creationId xmlns:a16="http://schemas.microsoft.com/office/drawing/2014/main" id="{FABEDCE9-8BC5-22A9-42E3-C0BF36D8FB21}"/>
+              </a:ext>
+            </a:extLst>
+          </p:cNvPr>
+          <p:cNvPicPr>
+            <a:picLocks noChangeAspect="1"/>
+          </p:cNvPicPr>
+          <p:nvPr/>
+        </p:nvPicPr>
+        <p:blipFill>
+          <a:blip r:embed="rId2"/>
+          <a:stretch>
+            <a:fillRect/>
+          </a:stretch>
+        </p:blipFill>
+        <p:spPr>
+          <a:xfrm>
+            <a:off x="6288617" y="0"/>
+            <a:ext cx="5976887" cy="6858000"/>
+          </a:xfrm>
+          <a:prstGeom prst="rect">
+            <a:avLst/>
+          </a:prstGeom>
+        </p:spPr>
+      </p:pic>
+    </p:spTree>
+    <p:extLst>
+      <p:ext uri="{BB962C8B-B14F-4D97-AF65-F5344CB8AC3E}">
+        <p14:creationId xmlns:p14="http://schemas.microsoft.com/office/powerpoint/2010/main" val="783232102"/>
+      </p:ext>
+    </p:extLst>
+  </p:cSld>
+  <p:clrMapOvr>
+    <a:masterClrMapping/>
+  </p:clrMapOvr>
+</p:sld>
+</file>
+
+<file path=ppt/slides/slide4.xml><?xml version="1.0" encoding="utf-8"?>
+<p:sld xmlns:a="http://schemas.openxmlformats.org/drawingml/2006/main" xmlns:r="http://schemas.openxmlformats.org/officeDocument/2006/relationships" xmlns:p="http://schemas.openxmlformats.org/presentationml/2006/main">
+  <p:cSld>
+    <p:spTree>
+      <p:nvGrpSpPr>
+        <p:cNvPr id="1" name=""/>
+        <p:cNvGrpSpPr/>
+        <p:nvPr/>
+      </p:nvGrpSpPr>
+      <p:grpSpPr>
+        <a:xfrm>
+          <a:off x="0" y="0"/>
+          <a:ext cx="0" cy="0"/>
+          <a:chOff x="0" y="0"/>
+          <a:chExt cx="0" cy="0"/>
+        </a:xfrm>
+      </p:grpSpPr>
+      <p:sp>
+        <p:nvSpPr>
+          <p:cNvPr id="2" name="Title 1">
+            <a:extLst>
+              <a:ext uri="{FF2B5EF4-FFF2-40B4-BE49-F238E27FC236}">
                 <a16:creationId xmlns:a16="http://schemas.microsoft.com/office/drawing/2014/main" id="{A739634A-5389-9636-CCCE-38FF6A1D318C}"/>
               </a:ext>
             </a:extLst>
@@ -6785,12 +6913,12 @@
           <a:lstStyle/>
           <a:p>
             <a:r>
-              <a:rPr lang="en-US" i="1" dirty="0"/>
+              <a:rPr lang="en-US" sz="2800" i="1" dirty="0"/>
               <a:t>import</a:t>
             </a:r>
             <a:r>
-              <a:rPr lang="en-US" dirty="0"/>
-              <a:t>: a keyword to insert/import objects from another file or module into our code. </a:t>
+              <a:rPr lang="en-US" sz="2800" dirty="0"/>
+              <a:t>: a keyword to insert/import objects from another module into our code. </a:t>
             </a:r>
           </a:p>
           <a:p>
@@ -6825,7 +6953,7 @@
         </p:blipFill>
         <p:spPr>
           <a:xfrm>
-            <a:off x="6202363" y="2996885"/>
+            <a:off x="5930572" y="3796108"/>
             <a:ext cx="5065712" cy="1529393"/>
           </a:xfrm>
         </p:spPr>
@@ -6873,7 +7001,7 @@
 </p:sld>
 </file>
 
-<file path=ppt/slides/slide4.xml><?xml version="1.0" encoding="utf-8"?>
+<file path=ppt/slides/slide5.xml><?xml version="1.0" encoding="utf-8"?>
 <p:sld xmlns:a="http://schemas.openxmlformats.org/drawingml/2006/main" xmlns:r="http://schemas.openxmlformats.org/officeDocument/2006/relationships" xmlns:p="http://schemas.openxmlformats.org/presentationml/2006/main">
   <p:cSld>
     <p:spTree>
@@ -6946,13 +7074,13 @@
           <a:lstStyle/>
           <a:p>
             <a:r>
-              <a:rPr lang="en-US" dirty="0"/>
+              <a:rPr lang="en-US" sz="2800" dirty="0"/>
               <a:t>from mod import * : importing all objects into the source code</a:t>
             </a:r>
           </a:p>
           <a:p>
             <a:r>
-              <a:rPr lang="en-US" dirty="0"/>
+              <a:rPr lang="en-US" sz="2800" dirty="0"/>
               <a:t>“.” not required explicitly</a:t>
             </a:r>
             <a:endParaRPr lang="en-MY" dirty="0"/>
@@ -6983,7 +7111,7 @@
         </p:blipFill>
         <p:spPr>
           <a:xfrm>
-            <a:off x="6202363" y="2985849"/>
+            <a:off x="6090676" y="3726486"/>
             <a:ext cx="5065712" cy="1551464"/>
           </a:xfrm>
         </p:spPr>
@@ -7010,7 +7138,7 @@
         </p:blipFill>
         <p:spPr>
           <a:xfrm>
-            <a:off x="5930572" y="1825625"/>
+            <a:off x="5930572" y="1704092"/>
             <a:ext cx="5423228" cy="1724908"/>
           </a:xfrm>
           <a:prstGeom prst="rect">
@@ -7031,7 +7159,7 @@
 </p:sld>
 </file>
 
-<file path=ppt/slides/slide5.xml><?xml version="1.0" encoding="utf-8"?>
+<file path=ppt/slides/slide6.xml><?xml version="1.0" encoding="utf-8"?>
 <p:sld xmlns:a="http://schemas.openxmlformats.org/drawingml/2006/main" xmlns:r="http://schemas.openxmlformats.org/officeDocument/2006/relationships" xmlns:p="http://schemas.openxmlformats.org/presentationml/2006/main">
   <p:cSld>
     <p:spTree>
@@ -7053,7 +7181,7 @@
           <p:cNvPr id="2" name="Title 1">
             <a:extLst>
               <a:ext uri="{FF2B5EF4-FFF2-40B4-BE49-F238E27FC236}">
-                <a16:creationId xmlns:a16="http://schemas.microsoft.com/office/drawing/2014/main" id="{25869FFF-B04C-7434-6F03-2916F3D17585}"/>
+                <a16:creationId xmlns:a16="http://schemas.microsoft.com/office/drawing/2014/main" id="{BCDAF918-C341-C5A3-1C42-E7CF4348F5C9}"/>
               </a:ext>
             </a:extLst>
           </p:cNvPr>
@@ -7064,18 +7192,21 @@
             <p:ph type="title"/>
           </p:nvPr>
         </p:nvSpPr>
-        <p:spPr/>
-        <p:txBody>
-          <a:bodyPr/>
-          <a:lstStyle/>
-          <a:p>
-            <a:r>
-              <a:rPr lang="en-US" dirty="0" err="1"/>
-              <a:t>dir</a:t>
-            </a:r>
+        <p:spPr>
+          <a:xfrm>
+            <a:off x="913795" y="609600"/>
+            <a:ext cx="5410805" cy="970450"/>
+          </a:xfrm>
+        </p:spPr>
+        <p:txBody>
+          <a:bodyPr>
+            <a:normAutofit fontScale="90000"/>
+          </a:bodyPr>
+          <a:lstStyle/>
+          <a:p>
             <a:r>
               <a:rPr lang="en-US" dirty="0"/>
-              <a:t>() dan help()</a:t>
+              <a:t>Python Standard Library</a:t>
             </a:r>
             <a:endParaRPr lang="en-MY" dirty="0"/>
           </a:p>
@@ -7086,7 +7217,7 @@
           <p:cNvPr id="3" name="Content Placeholder 2">
             <a:extLst>
               <a:ext uri="{FF2B5EF4-FFF2-40B4-BE49-F238E27FC236}">
-                <a16:creationId xmlns:a16="http://schemas.microsoft.com/office/drawing/2014/main" id="{96761E2A-F4AD-18E2-7597-64A81487221A}"/>
+                <a16:creationId xmlns:a16="http://schemas.microsoft.com/office/drawing/2014/main" id="{0C89C12E-2DB2-DDC8-8EDE-A91508A8A57D}"/>
               </a:ext>
             </a:extLst>
           </p:cNvPr>
@@ -7097,66 +7228,72 @@
             <p:ph sz="half" idx="1"/>
           </p:nvPr>
         </p:nvSpPr>
-        <p:spPr>
-          <a:xfrm>
-            <a:off x="838200" y="1825625"/>
-            <a:ext cx="3931763" cy="4351338"/>
-          </a:xfrm>
-        </p:spPr>
-        <p:txBody>
-          <a:bodyPr/>
-          <a:lstStyle/>
-          <a:p>
-            <a:r>
-              <a:rPr lang="en-US" dirty="0" err="1"/>
-              <a:t>dir</a:t>
-            </a:r>
-            <a:r>
-              <a:rPr lang="en-US" dirty="0"/>
-              <a:t>():  build-in function to check objects and functions/methods lists in an object. </a:t>
-            </a:r>
-          </a:p>
-          <a:p>
-            <a:r>
-              <a:rPr lang="en-US" dirty="0"/>
-              <a:t>help(): built-in function to read a object’s documentation/help</a:t>
-            </a:r>
+        <p:spPr/>
+        <p:txBody>
+          <a:bodyPr>
+            <a:normAutofit/>
+          </a:bodyPr>
+          <a:lstStyle/>
+          <a:p>
+            <a:r>
+              <a:rPr lang="en-US" sz="2400" dirty="0"/>
+              <a:t>Python comes with a library of standard modules</a:t>
+            </a:r>
+          </a:p>
+          <a:p>
+            <a:pPr marL="36900" indent="0">
+              <a:buNone/>
+            </a:pPr>
+            <a:r>
+              <a:rPr lang="en-US" sz="2400" dirty="0">
+                <a:hlinkClick r:id="rId2"/>
+              </a:rPr>
+              <a:t>https://docs.python.org/3/library/index.html</a:t>
+            </a:r>
+            <a:endParaRPr lang="en-US" sz="2400" dirty="0"/>
+          </a:p>
+          <a:p>
+            <a:pPr marL="36900" indent="0">
+              <a:buNone/>
+            </a:pPr>
+            <a:endParaRPr lang="en-MY" sz="2400" dirty="0"/>
           </a:p>
         </p:txBody>
       </p:sp>
       <p:pic>
         <p:nvPicPr>
-          <p:cNvPr id="10" name="Content Placeholder 9">
+          <p:cNvPr id="6" name="Picture 5">
             <a:extLst>
               <a:ext uri="{FF2B5EF4-FFF2-40B4-BE49-F238E27FC236}">
-                <a16:creationId xmlns:a16="http://schemas.microsoft.com/office/drawing/2014/main" id="{E9686724-45E1-6619-3118-EC9922C9FF85}"/>
+                <a16:creationId xmlns:a16="http://schemas.microsoft.com/office/drawing/2014/main" id="{1FB209DA-9E32-2C08-BEEA-A07BEF36DFEE}"/>
               </a:ext>
             </a:extLst>
           </p:cNvPr>
           <p:cNvPicPr>
-            <a:picLocks noGrp="1" noChangeAspect="1"/>
+            <a:picLocks noChangeAspect="1"/>
           </p:cNvPicPr>
-          <p:nvPr>
-            <p:ph sz="half" idx="2"/>
-          </p:nvPr>
+          <p:nvPr/>
         </p:nvPicPr>
         <p:blipFill>
-          <a:blip r:embed="rId2"/>
+          <a:blip r:embed="rId3"/>
           <a:stretch>
             <a:fillRect/>
           </a:stretch>
         </p:blipFill>
         <p:spPr>
           <a:xfrm>
-            <a:off x="5240139" y="2033013"/>
-            <a:ext cx="6113661" cy="2397583"/>
+            <a:off x="7366770" y="100012"/>
+            <a:ext cx="4610517" cy="6657975"/>
           </a:xfrm>
+          <a:prstGeom prst="rect">
+            <a:avLst/>
+          </a:prstGeom>
         </p:spPr>
       </p:pic>
     </p:spTree>
     <p:extLst>
       <p:ext uri="{BB962C8B-B14F-4D97-AF65-F5344CB8AC3E}">
-        <p14:creationId xmlns:p14="http://schemas.microsoft.com/office/powerpoint/2010/main" val="1906866129"/>
+        <p14:creationId xmlns:p14="http://schemas.microsoft.com/office/powerpoint/2010/main" val="2135314182"/>
       </p:ext>
     </p:extLst>
   </p:cSld>

</xml_diff>